<commit_message>
Aggiornamento ppt con pattern bridge
</commit_message>
<xml_diff>
--- a/Documenti/PROGETTO.pptx
+++ b/Documenti/PROGETTO.pptx
@@ -4426,7 +4426,7 @@
               <a:rPr lang="it-IT" sz="5000" b="1" dirty="0">
                 <a:latin typeface="+mn-lt"/>
               </a:rPr>
-              <a:t>METODO DOPO IL REFACTOR</a:t>
+              <a:t>METODO DOPO IL REFACTORING</a:t>
             </a:r>
           </a:p>
         </p:txBody>
@@ -5862,7 +5862,7 @@
         </p:spPr>
         <p:txBody>
           <a:bodyPr>
-            <a:normAutofit/>
+            <a:normAutofit fontScale="90000"/>
           </a:bodyPr>
           <a:lstStyle/>
           <a:p>
@@ -5870,7 +5870,7 @@
               <a:rPr lang="it-IT" sz="5000" b="1" dirty="0">
                 <a:latin typeface="+mn-lt"/>
               </a:rPr>
-              <a:t>EXTRACT METHOD: CREA MENU TEMATICO</a:t>
+              <a:t>EXTRACT METHOD: CREA MENU TEMATICO DOPO IL REFACTORING</a:t>
             </a:r>
           </a:p>
         </p:txBody>
@@ -6478,7 +6478,7 @@
         </p:nvSpPr>
         <p:spPr>
           <a:xfrm>
-            <a:off x="4514682" y="3592037"/>
+            <a:off x="4426584" y="4213475"/>
             <a:ext cx="1150620" cy="502920"/>
           </a:xfrm>
           <a:prstGeom prst="leftArrow">
@@ -6824,7 +6824,7 @@
         </p:nvSpPr>
         <p:spPr>
           <a:xfrm>
-            <a:off x="4945380" y="3547128"/>
+            <a:off x="4939652" y="4170891"/>
             <a:ext cx="1013460" cy="489651"/>
           </a:xfrm>
           <a:prstGeom prst="leftArrow">
@@ -7290,6 +7290,55 @@
           </a:p>
         </p:txBody>
       </p:sp>
+      <p:sp>
+        <p:nvSpPr>
+          <p:cNvPr id="6" name="Rettangolo 5">
+            <a:extLst>
+              <a:ext uri="{FF2B5EF4-FFF2-40B4-BE49-F238E27FC236}">
+                <a16:creationId xmlns:a16="http://schemas.microsoft.com/office/drawing/2014/main" id="{66DC955B-D609-C72A-C4ED-837C1C0176CC}"/>
+              </a:ext>
+            </a:extLst>
+          </p:cNvPr>
+          <p:cNvSpPr/>
+          <p:nvPr/>
+        </p:nvSpPr>
+        <p:spPr>
+          <a:xfrm>
+            <a:off x="1056443" y="3648722"/>
+            <a:ext cx="994299" cy="168676"/>
+          </a:xfrm>
+          <a:prstGeom prst="rect">
+            <a:avLst/>
+          </a:prstGeom>
+          <a:ln>
+            <a:solidFill>
+              <a:schemeClr val="bg1"/>
+            </a:solidFill>
+          </a:ln>
+        </p:spPr>
+        <p:style>
+          <a:lnRef idx="2">
+            <a:schemeClr val="accent6"/>
+          </a:lnRef>
+          <a:fillRef idx="1">
+            <a:schemeClr val="lt1"/>
+          </a:fillRef>
+          <a:effectRef idx="0">
+            <a:schemeClr val="accent6"/>
+          </a:effectRef>
+          <a:fontRef idx="minor">
+            <a:schemeClr val="dk1"/>
+          </a:fontRef>
+        </p:style>
+        <p:txBody>
+          <a:bodyPr rtlCol="0" anchor="ctr"/>
+          <a:lstStyle/>
+          <a:p>
+            <a:pPr algn="ctr"/>
+            <a:endParaRPr lang="it-IT"/>
+          </a:p>
+        </p:txBody>
+      </p:sp>
     </p:spTree>
     <p:extLst>
       <p:ext uri="{BB962C8B-B14F-4D97-AF65-F5344CB8AC3E}">
@@ -7389,6 +7438,42 @@
           </a:p>
         </p:txBody>
       </p:sp>
+      <p:pic>
+        <p:nvPicPr>
+          <p:cNvPr id="7" name="Immagine 6">
+            <a:extLst>
+              <a:ext uri="{FF2B5EF4-FFF2-40B4-BE49-F238E27FC236}">
+                <a16:creationId xmlns:a16="http://schemas.microsoft.com/office/drawing/2014/main" id="{D6B42FB9-8880-6A6F-F843-8E35CD32FCF3}"/>
+              </a:ext>
+            </a:extLst>
+          </p:cNvPr>
+          <p:cNvPicPr>
+            <a:picLocks noChangeAspect="1"/>
+          </p:cNvPicPr>
+          <p:nvPr/>
+        </p:nvPicPr>
+        <p:blipFill>
+          <a:blip r:embed="rId3">
+            <a:extLst>
+              <a:ext uri="{28A0092B-C50C-407E-A947-70E740481C1C}">
+                <a14:useLocalDpi xmlns:a14="http://schemas.microsoft.com/office/drawing/2010/main" val="0"/>
+              </a:ext>
+            </a:extLst>
+          </a:blip>
+          <a:stretch>
+            <a:fillRect/>
+          </a:stretch>
+        </p:blipFill>
+        <p:spPr>
+          <a:xfrm>
+            <a:off x="2509701" y="1559634"/>
+            <a:ext cx="7172578" cy="4679763"/>
+          </a:xfrm>
+          <a:prstGeom prst="rect">
+            <a:avLst/>
+          </a:prstGeom>
+        </p:spPr>
+      </p:pic>
     </p:spTree>
     <p:extLst>
       <p:ext uri="{BB962C8B-B14F-4D97-AF65-F5344CB8AC3E}">

</xml_diff>